<commit_message>
phase 2 minor improvements
</commit_message>
<xml_diff>
--- a/presentation/Team4_Presentation_phase1.pptx
+++ b/presentation/Team4_Presentation_phase1.pptx
@@ -12809,13 +12809,19 @@
           <a:p>
             <a:r>
               <a:rPr lang="en-DE" dirty="0"/>
-              <a:t>Pedestiran trajectory prediction is a Data-Drivien task which requires dataset of quality and sufficient quantity.</a:t>
+              <a:t>Pedestiran trajectory prediction is a Data - Drivien task which requires dataset of quality and sufficient quantity.</a:t>
             </a:r>
           </a:p>
           <a:p>
             <a:r>
               <a:rPr lang="en-DE" dirty="0"/>
-              <a:t>Datasets ETH (BIWI Walking Pedestrian ) - </a:t>
+              <a:t>Datasets </a:t>
+            </a:r>
+          </a:p>
+          <a:p>
+            <a:r>
+              <a:rPr lang="en-DE" dirty="0"/>
+              <a:t>ETH (BIWI Walking Pedestrian) - </a:t>
             </a:r>
             <a:r>
               <a:rPr lang="en-GB" dirty="0"/>
@@ -12840,16 +12846,13 @@
           <a:p>
             <a:r>
               <a:rPr lang="en-DE" dirty="0"/>
-              <a:t>UCY – (</a:t>
+              <a:t>UCY – </a:t>
             </a:r>
             <a:r>
               <a:rPr lang="en-GB" dirty="0"/>
               <a:t>Lerner et al. from the University of Cyprus</a:t>
             </a:r>
-            <a:r>
-              <a:rPr lang="en-DE" dirty="0"/>
-              <a:t>)</a:t>
-            </a:r>
+            <a:endParaRPr lang="en-DE" dirty="0"/>
           </a:p>
           <a:p>
             <a:pPr lvl="1"/>
@@ -13050,7 +13053,7 @@
         <p:spPr/>
         <p:txBody>
           <a:bodyPr>
-            <a:normAutofit fontScale="70000" lnSpcReduction="20000"/>
+            <a:normAutofit fontScale="92500" lnSpcReduction="20000"/>
           </a:bodyPr>
           <a:lstStyle/>
           <a:p>
@@ -13080,35 +13083,13 @@
           <a:p>
             <a:r>
               <a:rPr lang="en-GB" dirty="0"/>
-              <a:t>datasets scenes</a:t>
+              <a:t>ETH contain total 785 trajectories 365 and 420 for eth and hotel respectively</a:t>
             </a:r>
           </a:p>
           <a:p>
             <a:r>
               <a:rPr lang="en-GB" dirty="0"/>
-              <a:t>Most left image represents scene from eth, 2</a:t>
-            </a:r>
-            <a:r>
-              <a:rPr lang="en-GB" baseline="30000" dirty="0"/>
-              <a:t>nd</a:t>
-            </a:r>
-            <a:r>
-              <a:rPr lang="en-GB" dirty="0"/>
-              <a:t> one is ETH hotel dataset</a:t>
-            </a:r>
-          </a:p>
-          <a:p>
-            <a:r>
-              <a:rPr lang="en-GB" dirty="0"/>
-              <a:t>3</a:t>
-            </a:r>
-            <a:r>
-              <a:rPr lang="en-GB" baseline="30000" dirty="0"/>
-              <a:t>rd</a:t>
-            </a:r>
-            <a:r>
-              <a:rPr lang="en-GB" dirty="0"/>
-              <a:t> image is UCY </a:t>
+              <a:t>UCY contain 1100 trajectories data 850, 148, and 204 for </a:t>
             </a:r>
             <a:r>
               <a:rPr lang="en-GB" dirty="0" err="1"/>
@@ -13116,15 +13097,7 @@
             </a:r>
             <a:r>
               <a:rPr lang="en-GB" dirty="0"/>
-              <a:t> scene and 4</a:t>
-            </a:r>
-            <a:r>
-              <a:rPr lang="en-GB" baseline="30000" dirty="0"/>
-              <a:t>th</a:t>
-            </a:r>
-            <a:r>
-              <a:rPr lang="en-GB" dirty="0"/>
-              <a:t> represents zara1 and zara2</a:t>
+              <a:t>, zara1 and zara2</a:t>
             </a:r>
           </a:p>
           <a:p>
@@ -13202,26 +13175,6 @@
             <a:r>
               <a:rPr lang="en-GB" dirty="0"/>
               <a:t>]</a:t>
-            </a:r>
-          </a:p>
-          <a:p>
-            <a:r>
-              <a:rPr lang="en-GB" dirty="0"/>
-              <a:t>UCY contain 1100 trajectories data 850, 148, and 204 for </a:t>
-            </a:r>
-            <a:r>
-              <a:rPr lang="en-GB" dirty="0" err="1"/>
-              <a:t>univ</a:t>
-            </a:r>
-            <a:r>
-              <a:rPr lang="en-GB" dirty="0"/>
-              <a:t>, zara1 and zara2</a:t>
-            </a:r>
-          </a:p>
-          <a:p>
-            <a:r>
-              <a:rPr lang="en-GB" dirty="0"/>
-              <a:t>ETH contain total 785. 365 and 420 for eth and hotel respectively</a:t>
             </a:r>
           </a:p>
           <a:p>

</xml_diff>